<commit_message>
review GLCD lab before class 2016
</commit_message>
<xml_diff>
--- a/Labs/Lab06-Graphics_LCD/Lab06-Graphics_LCD.pptx
+++ b/Labs/Lab06-Graphics_LCD/Lab06-Graphics_LCD.pptx
@@ -575,7 +575,7 @@
           <a:p>
             <a:fld id="{28320CCE-C547-4A70-B16F-104818F71F93}" type="datetimeFigureOut">
               <a:rPr lang="zh-TW" altLang="en-US" smtClean="0"/>
-              <a:t>2015/11/26</a:t>
+              <a:t>2016/11/30</a:t>
             </a:fld>
             <a:endParaRPr lang="zh-TW" altLang="en-US"/>
           </a:p>
@@ -779,7 +779,7 @@
           <a:p>
             <a:fld id="{28320CCE-C547-4A70-B16F-104818F71F93}" type="datetimeFigureOut">
               <a:rPr lang="zh-TW" altLang="en-US" smtClean="0"/>
-              <a:t>2015/11/26</a:t>
+              <a:t>2016/11/30</a:t>
             </a:fld>
             <a:endParaRPr lang="zh-TW" altLang="en-US"/>
           </a:p>
@@ -971,7 +971,7 @@
           <a:p>
             <a:fld id="{28320CCE-C547-4A70-B16F-104818F71F93}" type="datetimeFigureOut">
               <a:rPr lang="zh-TW" altLang="en-US" smtClean="0"/>
-              <a:t>2015/11/26</a:t>
+              <a:t>2016/11/30</a:t>
             </a:fld>
             <a:endParaRPr lang="zh-TW" altLang="en-US"/>
           </a:p>
@@ -1194,7 +1194,7 @@
           <a:p>
             <a:fld id="{28320CCE-C547-4A70-B16F-104818F71F93}" type="datetimeFigureOut">
               <a:rPr lang="zh-TW" altLang="en-US" smtClean="0"/>
-              <a:t>2015/11/26</a:t>
+              <a:t>2016/11/30</a:t>
             </a:fld>
             <a:endParaRPr lang="zh-TW" altLang="en-US"/>
           </a:p>
@@ -1404,7 +1404,7 @@
           <a:p>
             <a:fld id="{28320CCE-C547-4A70-B16F-104818F71F93}" type="datetimeFigureOut">
               <a:rPr lang="zh-TW" altLang="en-US" smtClean="0"/>
-              <a:t>2015/11/26</a:t>
+              <a:t>2016/11/30</a:t>
             </a:fld>
             <a:endParaRPr lang="zh-TW" altLang="en-US"/>
           </a:p>
@@ -1704,7 +1704,7 @@
           <a:p>
             <a:fld id="{28320CCE-C547-4A70-B16F-104818F71F93}" type="datetimeFigureOut">
               <a:rPr lang="zh-TW" altLang="en-US" smtClean="0"/>
-              <a:t>2015/11/26</a:t>
+              <a:t>2016/11/30</a:t>
             </a:fld>
             <a:endParaRPr lang="zh-TW" altLang="en-US"/>
           </a:p>
@@ -2143,7 +2143,7 @@
           <a:p>
             <a:fld id="{28320CCE-C547-4A70-B16F-104818F71F93}" type="datetimeFigureOut">
               <a:rPr lang="zh-TW" altLang="en-US" smtClean="0"/>
-              <a:t>2015/11/26</a:t>
+              <a:t>2016/11/30</a:t>
             </a:fld>
             <a:endParaRPr lang="zh-TW" altLang="en-US"/>
           </a:p>
@@ -2283,7 +2283,7 @@
           <a:p>
             <a:fld id="{28320CCE-C547-4A70-B16F-104818F71F93}" type="datetimeFigureOut">
               <a:rPr lang="zh-TW" altLang="en-US" smtClean="0"/>
-              <a:t>2015/11/26</a:t>
+              <a:t>2016/11/30</a:t>
             </a:fld>
             <a:endParaRPr lang="zh-TW" altLang="en-US"/>
           </a:p>
@@ -2396,7 +2396,7 @@
           <a:p>
             <a:fld id="{28320CCE-C547-4A70-B16F-104818F71F93}" type="datetimeFigureOut">
               <a:rPr lang="zh-TW" altLang="en-US" smtClean="0"/>
-              <a:t>2015/11/26</a:t>
+              <a:t>2016/11/30</a:t>
             </a:fld>
             <a:endParaRPr lang="zh-TW" altLang="en-US"/>
           </a:p>
@@ -2685,7 +2685,7 @@
           <a:p>
             <a:fld id="{28320CCE-C547-4A70-B16F-104818F71F93}" type="datetimeFigureOut">
               <a:rPr lang="zh-TW" altLang="en-US" smtClean="0"/>
-              <a:t>2015/11/26</a:t>
+              <a:t>2016/11/30</a:t>
             </a:fld>
             <a:endParaRPr lang="zh-TW" altLang="en-US"/>
           </a:p>
@@ -2954,7 +2954,7 @@
           <a:p>
             <a:fld id="{28320CCE-C547-4A70-B16F-104818F71F93}" type="datetimeFigureOut">
               <a:rPr lang="zh-TW" altLang="en-US" smtClean="0"/>
-              <a:t>2015/11/26</a:t>
+              <a:t>2016/11/30</a:t>
             </a:fld>
             <a:endParaRPr lang="zh-TW" altLang="en-US"/>
           </a:p>
@@ -3511,7 +3511,7 @@
           <a:p>
             <a:fld id="{28320CCE-C547-4A70-B16F-104818F71F93}" type="datetimeFigureOut">
               <a:rPr lang="zh-TW" altLang="en-US" smtClean="0"/>
-              <a:t>2015/11/26</a:t>
+              <a:t>2016/11/30</a:t>
             </a:fld>
             <a:endParaRPr lang="zh-TW" altLang="en-US"/>
           </a:p>
@@ -4789,7 +4789,24 @@
             <a:pPr lvl="1"/>
             <a:r>
               <a:rPr lang="en-US" altLang="zh-TW" dirty="0" smtClean="0"/>
-              <a:t>Draw (char x, char y, char bitmap)</a:t>
+              <a:t>Draw (char x, char y, char bitmap</a:t>
+            </a:r>
+            <a:r>
+              <a:rPr lang="en-US" altLang="zh-TW" dirty="0" smtClean="0"/>
+              <a:t>)</a:t>
+            </a:r>
+          </a:p>
+          <a:p>
+            <a:r>
+              <a:rPr lang="en-US" altLang="zh-TW" dirty="0" smtClean="0"/>
+              <a:t>Q3: find a tool to generate the bitmap of your image</a:t>
+            </a:r>
+          </a:p>
+          <a:p>
+            <a:pPr lvl="1"/>
+            <a:r>
+              <a:rPr lang="en-US" altLang="zh-TW" dirty="0" smtClean="0"/>
+              <a:t>Please google!</a:t>
             </a:r>
             <a:endParaRPr lang="zh-TW" altLang="en-US" dirty="0"/>
           </a:p>
@@ -5123,7 +5140,7 @@
             <a:pPr lvl="1"/>
             <a:r>
               <a:rPr lang="en-US" altLang="zh-TW" sz="2400" dirty="0" smtClean="0"/>
-              <a:t>11/26: </a:t>
+              <a:t>12/01: </a:t>
             </a:r>
             <a:r>
               <a:rPr lang="en-US" altLang="zh-TW" sz="2400" dirty="0" smtClean="0"/>
@@ -5134,12 +5151,32 @@
             <a:pPr lvl="1"/>
             <a:r>
               <a:rPr lang="en-US" altLang="zh-TW" sz="2400" dirty="0" smtClean="0"/>
-              <a:t>12/03: </a:t>
+              <a:t>12/08: demo </a:t>
             </a:r>
             <a:r>
               <a:rPr lang="en-US" altLang="zh-TW" sz="2400" dirty="0" smtClean="0"/>
-              <a:t>demo the drawn image and animation</a:t>
-            </a:r>
+              <a:t>the drawn image and </a:t>
+            </a:r>
+            <a:r>
+              <a:rPr lang="en-US" altLang="zh-TW" sz="2400" dirty="0" smtClean="0"/>
+              <a:t>animation</a:t>
+            </a:r>
+          </a:p>
+          <a:p>
+            <a:pPr lvl="2"/>
+            <a:r>
+              <a:rPr lang="en-US" altLang="zh-TW" sz="2000" dirty="0" smtClean="0">
+                <a:solidFill>
+                  <a:srgbClr val="FF0000"/>
+                </a:solidFill>
+              </a:rPr>
+              <a:t>Hand-in the pre-lab report</a:t>
+            </a:r>
+            <a:endParaRPr lang="en-US" altLang="zh-TW" sz="2000" dirty="0" smtClean="0">
+              <a:solidFill>
+                <a:srgbClr val="FF0000"/>
+              </a:solidFill>
+            </a:endParaRPr>
           </a:p>
           <a:p>
             <a:r>
@@ -5148,7 +5185,15 @@
             </a:r>
             <a:r>
               <a:rPr lang="en-US" altLang="zh-TW" sz="2800" dirty="0" smtClean="0"/>
-              <a:t>12/10 – 12/17)</a:t>
+              <a:t>12/15 </a:t>
+            </a:r>
+            <a:r>
+              <a:rPr lang="en-US" altLang="zh-TW" sz="2800" dirty="0" smtClean="0"/>
+              <a:t>– </a:t>
+            </a:r>
+            <a:r>
+              <a:rPr lang="en-US" altLang="zh-TW" sz="2800" dirty="0" smtClean="0"/>
+              <a:t>12/22)</a:t>
             </a:r>
             <a:endParaRPr lang="en-US" altLang="zh-TW" sz="2800" dirty="0" smtClean="0"/>
           </a:p>
@@ -5162,7 +5207,11 @@
             <a:pPr lvl="1"/>
             <a:r>
               <a:rPr lang="en-US" altLang="zh-TW" sz="2400" dirty="0" smtClean="0"/>
-              <a:t>Begin at 12/24</a:t>
+              <a:t>Begin at </a:t>
+            </a:r>
+            <a:r>
+              <a:rPr lang="en-US" altLang="zh-TW" sz="2400" dirty="0" smtClean="0"/>
+              <a:t>12/29</a:t>
             </a:r>
             <a:endParaRPr lang="zh-TW" altLang="en-US" sz="2400" dirty="0"/>
           </a:p>

</xml_diff>